<commit_message>
again revised project proposal to include drums
</commit_message>
<xml_diff>
--- a/project_1/docs/Voigt_Eric_ENGI301_revised_project_proposal.pptx
+++ b/project_1/docs/Voigt_Eric_ENGI301_revised_project_proposal.pptx
@@ -219,7 +219,7 @@
           <a:p>
             <a:fld id="{59041DB8-B66F-4DC8-A96E-33677E0F90FF}" type="datetimeFigureOut">
               <a:rPr lang="en-US" smtClean="0"/>
-              <a:t>10/22/2019</a:t>
+              <a:t>11/5/2019</a:t>
             </a:fld>
             <a:endParaRPr lang="en-US"/>
           </a:p>
@@ -384,7 +384,7 @@
           <a:p>
             <a:fld id="{DEB49C4A-65AC-492D-9701-81B46C3AD0E4}" type="datetimeFigureOut">
               <a:rPr lang="en-US" smtClean="0"/>
-              <a:t>10/22/2019</a:t>
+              <a:t>11/5/2019</a:t>
             </a:fld>
             <a:endParaRPr lang="en-US"/>
           </a:p>
@@ -2876,7 +2876,7 @@
           <a:p>
             <a:fld id="{384A29A4-78C8-47AB-BA06-22CB45938951}" type="datetime1">
               <a:rPr lang="en-US" smtClean="0"/>
-              <a:t>10/22/2019</a:t>
+              <a:t>11/5/2019</a:t>
             </a:fld>
             <a:endParaRPr lang="en-US"/>
           </a:p>
@@ -3071,7 +3071,7 @@
           <a:p>
             <a:fld id="{E1ED4ACF-2D82-46F2-A8E9-23963AA34E86}" type="datetime1">
               <a:rPr lang="en-US" smtClean="0"/>
-              <a:t>10/22/2019</a:t>
+              <a:t>11/5/2019</a:t>
             </a:fld>
             <a:endParaRPr lang="en-US"/>
           </a:p>
@@ -3265,7 +3265,7 @@
           <a:p>
             <a:fld id="{AE374B5B-21A0-4192-BF4C-38187F1A68D8}" type="datetime1">
               <a:rPr lang="en-US" smtClean="0"/>
-              <a:t>10/22/2019</a:t>
+              <a:t>11/5/2019</a:t>
             </a:fld>
             <a:endParaRPr lang="en-US"/>
           </a:p>
@@ -5606,7 +5606,7 @@
           <a:p>
             <a:fld id="{33B5CF7C-B333-48E1-A4A6-83A3C8B73AC0}" type="datetime1">
               <a:rPr lang="en-US" smtClean="0"/>
-              <a:t>10/22/2019</a:t>
+              <a:t>11/5/2019</a:t>
             </a:fld>
             <a:endParaRPr lang="en-US"/>
           </a:p>
@@ -6059,7 +6059,7 @@
           <a:p>
             <a:fld id="{AE320762-5CBF-4210-AB54-376B091119F8}" type="datetime1">
               <a:rPr lang="en-US" smtClean="0"/>
-              <a:t>10/22/2019</a:t>
+              <a:t>11/5/2019</a:t>
             </a:fld>
             <a:endParaRPr lang="en-US"/>
           </a:p>
@@ -6191,7 +6191,7 @@
           <a:p>
             <a:fld id="{7F0DB371-BF5F-4058-A212-1A908E4D2674}" type="datetime1">
               <a:rPr lang="en-US" smtClean="0"/>
-              <a:t>10/22/2019</a:t>
+              <a:t>11/5/2019</a:t>
             </a:fld>
             <a:endParaRPr lang="en-US"/>
           </a:p>
@@ -8124,7 +8124,7 @@
           <a:p>
             <a:fld id="{60A4083B-90AA-48CF-BAD5-00AA24D7F288}" type="datetime1">
               <a:rPr lang="en-US" smtClean="0"/>
-              <a:t>10/22/2019</a:t>
+              <a:t>11/5/2019</a:t>
             </a:fld>
             <a:endParaRPr lang="en-US"/>
           </a:p>
@@ -10383,7 +10383,7 @@
             <a:fld id="{F5BAF629-ECA2-4CF3-B790-9D9BDED98269}" type="datetime1">
               <a:rPr lang="en-US" smtClean="0"/>
               <a:pPr/>
-              <a:t>10/22/2019</a:t>
+              <a:t>11/5/2019</a:t>
             </a:fld>
             <a:endParaRPr lang="en-US"/>
           </a:p>
@@ -14678,7 +14678,7 @@
             <a:fld id="{B51B2453-8663-4C69-AF73-9FD7B1DEC5D0}" type="datetime1">
               <a:rPr lang="en-US" smtClean="0"/>
               <a:pPr/>
-              <a:t>10/22/2019</a:t>
+              <a:t>11/5/2019</a:t>
             </a:fld>
             <a:endParaRPr lang="en-US" dirty="0"/>
           </a:p>
@@ -15167,7 +15167,7 @@
             </a:br>
             <a:r>
               <a:rPr lang="en-US" sz="6000" dirty="0"/>
-              <a:t>Keyboard Glove Proposal</a:t>
+              <a:t>Drum Kit Glove Proposal</a:t>
             </a:r>
             <a:endParaRPr lang="en-US" dirty="0"/>
           </a:p>
@@ -15195,7 +15195,7 @@
           <a:p>
             <a:r>
               <a:rPr lang="en-US" dirty="0"/>
-              <a:t>10/22/2019</a:t>
+              <a:t>11/05/2019</a:t>
             </a:r>
           </a:p>
           <a:p>
@@ -15326,7 +15326,7 @@
         <p:spPr>
           <a:xfrm>
             <a:off x="7909560" y="2999232"/>
-            <a:ext cx="3825240" cy="3858768"/>
+            <a:ext cx="4053840" cy="3858768"/>
           </a:xfrm>
           <a:prstGeom prst="rect">
             <a:avLst/>
@@ -15340,7 +15340,7 @@
           <a:p>
             <a:r>
               <a:rPr lang="en-US" sz="2000" dirty="0"/>
-              <a:t>Wearable synth glove</a:t>
+              <a:t>Wearable glove</a:t>
             </a:r>
           </a:p>
           <a:p>
@@ -15383,7 +15383,7 @@
                   <a:schemeClr val="bg1"/>
                 </a:solidFill>
               </a:rPr>
-              <a:t> note scale</a:t>
+              <a:t> fingers are kit elements</a:t>
             </a:r>
           </a:p>
           <a:p>
@@ -15394,7 +15394,7 @@
                   <a:schemeClr val="bg1"/>
                 </a:solidFill>
               </a:rPr>
-              <a:t>Note triggered by bend in finger</a:t>
+              <a:t>Triggered by bend in finger</a:t>
             </a:r>
           </a:p>
           <a:p>
@@ -15459,47 +15459,32 @@
       </p:sp>
       <p:pic>
         <p:nvPicPr>
-          <p:cNvPr id="1026" name="Picture 2">
+          <p:cNvPr id="4" name="Picture 3">
             <a:extLst>
               <a:ext uri="{FF2B5EF4-FFF2-40B4-BE49-F238E27FC236}">
-                <a16:creationId xmlns:a16="http://schemas.microsoft.com/office/drawing/2014/main" id="{0C44D2BD-E4FC-4D1E-8F71-FB9B499FC18D}"/>
+                <a16:creationId xmlns:a16="http://schemas.microsoft.com/office/drawing/2014/main" id="{1F283B57-F734-48F4-8BB3-5836A06F9E58}"/>
               </a:ext>
             </a:extLst>
           </p:cNvPr>
           <p:cNvPicPr>
-            <a:picLocks noChangeAspect="1" noChangeArrowheads="1"/>
+            <a:picLocks noChangeAspect="1"/>
           </p:cNvPicPr>
           <p:nvPr/>
         </p:nvPicPr>
-        <p:blipFill rotWithShape="1">
-          <a:blip r:embed="rId3">
-            <a:extLst>
-              <a:ext uri="{28A0092B-C50C-407E-A947-70E740481C1C}">
-                <a14:useLocalDpi xmlns:a14="http://schemas.microsoft.com/office/drawing/2010/main" val="0"/>
-              </a:ext>
-            </a:extLst>
-          </a:blip>
-          <a:srcRect r="20000"/>
-          <a:stretch/>
+        <p:blipFill>
+          <a:blip r:embed="rId3"/>
+          <a:stretch>
+            <a:fillRect/>
+          </a:stretch>
         </p:blipFill>
-        <p:spPr bwMode="auto">
+        <p:spPr>
           <a:xfrm>
-            <a:off x="0" y="0"/>
-            <a:ext cx="7315200" cy="6858000"/>
+            <a:off x="228600" y="0"/>
+            <a:ext cx="6858000" cy="6858000"/>
           </a:xfrm>
           <a:prstGeom prst="rect">
             <a:avLst/>
           </a:prstGeom>
-          <a:noFill/>
-          <a:extLst>
-            <a:ext uri="{909E8E84-426E-40DD-AFC4-6F175D3DCCD1}">
-              <a14:hiddenFill xmlns:a14="http://schemas.microsoft.com/office/drawing/2010/main">
-                <a:solidFill>
-                  <a:srgbClr val="FFFFFF"/>
-                </a:solidFill>
-              </a14:hiddenFill>
-            </a:ext>
-          </a:extLst>
         </p:spPr>
       </p:pic>
     </p:spTree>
@@ -15595,7 +15580,7 @@
           <a:p>
             <a:r>
               <a:rPr lang="en-US" dirty="0"/>
-              <a:t>Based on Existing Arduino project</a:t>
+              <a:t>Based on existing Arduino project</a:t>
             </a:r>
           </a:p>
           <a:p>

</xml_diff>

<commit_message>
assembling final documentation for project
</commit_message>
<xml_diff>
--- a/project_1/docs/Voigt_Eric_ENGI301_revised_project_proposal.pptx
+++ b/project_1/docs/Voigt_Eric_ENGI301_revised_project_proposal.pptx
@@ -219,7 +219,7 @@
           <a:p>
             <a:fld id="{59041DB8-B66F-4DC8-A96E-33677E0F90FF}" type="datetimeFigureOut">
               <a:rPr lang="en-US" smtClean="0"/>
-              <a:t>11/5/2019</a:t>
+              <a:t>11/13/2019</a:t>
             </a:fld>
             <a:endParaRPr lang="en-US"/>
           </a:p>
@@ -384,7 +384,7 @@
           <a:p>
             <a:fld id="{DEB49C4A-65AC-492D-9701-81B46C3AD0E4}" type="datetimeFigureOut">
               <a:rPr lang="en-US" smtClean="0"/>
-              <a:t>11/5/2019</a:t>
+              <a:t>11/13/2019</a:t>
             </a:fld>
             <a:endParaRPr lang="en-US"/>
           </a:p>
@@ -2876,7 +2876,7 @@
           <a:p>
             <a:fld id="{384A29A4-78C8-47AB-BA06-22CB45938951}" type="datetime1">
               <a:rPr lang="en-US" smtClean="0"/>
-              <a:t>11/5/2019</a:t>
+              <a:t>11/13/2019</a:t>
             </a:fld>
             <a:endParaRPr lang="en-US"/>
           </a:p>
@@ -3071,7 +3071,7 @@
           <a:p>
             <a:fld id="{E1ED4ACF-2D82-46F2-A8E9-23963AA34E86}" type="datetime1">
               <a:rPr lang="en-US" smtClean="0"/>
-              <a:t>11/5/2019</a:t>
+              <a:t>11/13/2019</a:t>
             </a:fld>
             <a:endParaRPr lang="en-US"/>
           </a:p>
@@ -3265,7 +3265,7 @@
           <a:p>
             <a:fld id="{AE374B5B-21A0-4192-BF4C-38187F1A68D8}" type="datetime1">
               <a:rPr lang="en-US" smtClean="0"/>
-              <a:t>11/5/2019</a:t>
+              <a:t>11/13/2019</a:t>
             </a:fld>
             <a:endParaRPr lang="en-US"/>
           </a:p>
@@ -5606,7 +5606,7 @@
           <a:p>
             <a:fld id="{33B5CF7C-B333-48E1-A4A6-83A3C8B73AC0}" type="datetime1">
               <a:rPr lang="en-US" smtClean="0"/>
-              <a:t>11/5/2019</a:t>
+              <a:t>11/13/2019</a:t>
             </a:fld>
             <a:endParaRPr lang="en-US"/>
           </a:p>
@@ -6059,7 +6059,7 @@
           <a:p>
             <a:fld id="{AE320762-5CBF-4210-AB54-376B091119F8}" type="datetime1">
               <a:rPr lang="en-US" smtClean="0"/>
-              <a:t>11/5/2019</a:t>
+              <a:t>11/13/2019</a:t>
             </a:fld>
             <a:endParaRPr lang="en-US"/>
           </a:p>
@@ -6191,7 +6191,7 @@
           <a:p>
             <a:fld id="{7F0DB371-BF5F-4058-A212-1A908E4D2674}" type="datetime1">
               <a:rPr lang="en-US" smtClean="0"/>
-              <a:t>11/5/2019</a:t>
+              <a:t>11/13/2019</a:t>
             </a:fld>
             <a:endParaRPr lang="en-US"/>
           </a:p>
@@ -8124,7 +8124,7 @@
           <a:p>
             <a:fld id="{60A4083B-90AA-48CF-BAD5-00AA24D7F288}" type="datetime1">
               <a:rPr lang="en-US" smtClean="0"/>
-              <a:t>11/5/2019</a:t>
+              <a:t>11/13/2019</a:t>
             </a:fld>
             <a:endParaRPr lang="en-US"/>
           </a:p>
@@ -10383,7 +10383,7 @@
             <a:fld id="{F5BAF629-ECA2-4CF3-B790-9D9BDED98269}" type="datetime1">
               <a:rPr lang="en-US" smtClean="0"/>
               <a:pPr/>
-              <a:t>11/5/2019</a:t>
+              <a:t>11/13/2019</a:t>
             </a:fld>
             <a:endParaRPr lang="en-US"/>
           </a:p>
@@ -14678,7 +14678,7 @@
             <a:fld id="{B51B2453-8663-4C69-AF73-9FD7B1DEC5D0}" type="datetime1">
               <a:rPr lang="en-US" smtClean="0"/>
               <a:pPr/>
-              <a:t>11/5/2019</a:t>
+              <a:t>11/13/2019</a:t>
             </a:fld>
             <a:endParaRPr lang="en-US" dirty="0"/>
           </a:p>
@@ -15156,20 +15156,20 @@
           <a:lstStyle/>
           <a:p>
             <a:r>
-              <a:rPr lang="en-US" sz="6000" dirty="0"/>
+              <a:rPr lang="en-US" sz="5400" dirty="0"/>
               <a:t>ENGI 301</a:t>
             </a:r>
             <a:br>
-              <a:rPr lang="en-US" sz="6000" dirty="0"/>
+              <a:rPr lang="en-US" sz="5400" dirty="0"/>
             </a:br>
             <a:br>
-              <a:rPr lang="en-US" dirty="0"/>
+              <a:rPr lang="en-US" sz="7200" dirty="0"/>
             </a:br>
             <a:r>
-              <a:rPr lang="en-US" sz="6000" dirty="0"/>
-              <a:t>Drum Kit Glove Proposal</a:t>
+              <a:rPr lang="en-US" sz="5400" dirty="0"/>
+              <a:t>Instrument Glove Proposal</a:t>
             </a:r>
-            <a:endParaRPr lang="en-US" dirty="0"/>
+            <a:endParaRPr lang="en-US" sz="7200" dirty="0"/>
           </a:p>
         </p:txBody>
       </p:sp>
@@ -15195,7 +15195,7 @@
           <a:p>
             <a:r>
               <a:rPr lang="en-US" dirty="0"/>
-              <a:t>11/05/2019</a:t>
+              <a:t>11/15/2019</a:t>
             </a:r>
           </a:p>
           <a:p>
@@ -15994,14 +15994,14 @@
             <p:ph idx="1"/>
             <p:extLst>
               <p:ext uri="{D42A27DB-BD31-4B8C-83A1-F6EECF244321}">
-                <p14:modId xmlns:p14="http://schemas.microsoft.com/office/powerpoint/2010/main" val="1825637561"/>
+                <p14:modId xmlns:p14="http://schemas.microsoft.com/office/powerpoint/2010/main" val="438130053"/>
               </p:ext>
             </p:extLst>
           </p:nvPr>
         </p:nvGraphicFramePr>
         <p:xfrm>
-          <a:off x="609600" y="1295400"/>
-          <a:ext cx="10972800" cy="2966720"/>
+          <a:off x="606287" y="1154816"/>
+          <a:ext cx="10972800" cy="4450080"/>
         </p:xfrm>
         <a:graphic>
           <a:graphicData uri="http://schemas.openxmlformats.org/drawingml/2006/table">
@@ -16228,7 +16228,23 @@
                     <a:p>
                       <a:r>
                         <a:rPr lang="en-US" dirty="0"/>
-                        <a:t>USB Audio Adapter</a:t>
+                        <a:t>USB Audio Adapter, USB to </a:t>
+                      </a:r>
+                      <a:r>
+                        <a:rPr lang="en-US" dirty="0" err="1"/>
+                        <a:t>microUSB</a:t>
+                      </a:r>
+                      <a:r>
+                        <a:rPr lang="en-US" dirty="0"/>
+                        <a:t> Adapter, and </a:t>
+                      </a:r>
+                      <a:r>
+                        <a:rPr lang="en-US" dirty="0" err="1"/>
+                        <a:t>microUSB</a:t>
+                      </a:r>
+                      <a:r>
+                        <a:rPr lang="en-US" dirty="0"/>
+                        <a:t> Adapter</a:t>
                       </a:r>
                     </a:p>
                   </a:txBody>
@@ -16274,7 +16290,7 @@
                     <a:p>
                       <a:r>
                         <a:rPr lang="en-US" dirty="0"/>
-                        <a:t>Breadboard</a:t>
+                        <a:t>Breadboard, Jumper Wires, Pins</a:t>
                       </a:r>
                     </a:p>
                   </a:txBody>
@@ -16318,9 +16334,26 @@
                     <a:bodyPr/>
                     <a:lstStyle/>
                     <a:p>
+                      <a:pPr marL="0" marR="0" lvl="0" indent="0" algn="l" defTabSz="914400" rtl="0" eaLnBrk="1" fontAlgn="auto" latinLnBrk="0" hangingPunct="1">
+                        <a:lnSpc>
+                          <a:spcPct val="100000"/>
+                        </a:lnSpc>
+                        <a:spcBef>
+                          <a:spcPts val="0"/>
+                        </a:spcBef>
+                        <a:spcAft>
+                          <a:spcPts val="0"/>
+                        </a:spcAft>
+                        <a:buClrTx/>
+                        <a:buSzTx/>
+                        <a:buFontTx/>
+                        <a:buNone/>
+                        <a:tabLst/>
+                        <a:defRPr/>
+                      </a:pPr>
                       <a:r>
-                        <a:rPr lang="en-US" dirty="0"/>
-                        <a:t>Jumper Wires</a:t>
+                        <a:rPr lang="en-US" b="0" dirty="0"/>
+                        <a:t>Female Crimp Pins</a:t>
                       </a:r>
                     </a:p>
                   </a:txBody>
@@ -16355,6 +16388,202 @@
                 <a:extLst>
                   <a:ext uri="{0D108BD9-81ED-4DB2-BD59-A6C34878D82A}">
                     <a16:rowId xmlns:a16="http://schemas.microsoft.com/office/drawing/2014/main" val="1364489299"/>
+                  </a:ext>
+                </a:extLst>
+              </a:tr>
+              <a:tr h="370840">
+                <a:tc>
+                  <a:txBody>
+                    <a:bodyPr/>
+                    <a:lstStyle/>
+                    <a:p>
+                      <a:r>
+                        <a:rPr lang="en-US" b="0" dirty="0"/>
+                        <a:t>10k Resistors, 22AWG Wires</a:t>
+                      </a:r>
+                    </a:p>
+                  </a:txBody>
+                  <a:tcPr/>
+                </a:tc>
+                <a:tc>
+                  <a:txBody>
+                    <a:bodyPr/>
+                    <a:lstStyle/>
+                    <a:p>
+                      <a:r>
+                        <a:rPr lang="en-US" dirty="0"/>
+                        <a:t>OEDK</a:t>
+                      </a:r>
+                    </a:p>
+                  </a:txBody>
+                  <a:tcPr/>
+                </a:tc>
+                <a:tc>
+                  <a:txBody>
+                    <a:bodyPr/>
+                    <a:lstStyle/>
+                    <a:p>
+                      <a:r>
+                        <a:rPr lang="en-US" dirty="0"/>
+                        <a:t>$0</a:t>
+                      </a:r>
+                    </a:p>
+                  </a:txBody>
+                  <a:tcPr/>
+                </a:tc>
+                <a:extLst>
+                  <a:ext uri="{0D108BD9-81ED-4DB2-BD59-A6C34878D82A}">
+                    <a16:rowId xmlns:a16="http://schemas.microsoft.com/office/drawing/2014/main" val="2337708406"/>
+                  </a:ext>
+                </a:extLst>
+              </a:tr>
+              <a:tr h="370840">
+                <a:tc>
+                  <a:txBody>
+                    <a:bodyPr/>
+                    <a:lstStyle/>
+                    <a:p>
+                      <a:r>
+                        <a:rPr lang="en-US" b="0" dirty="0" err="1"/>
+                        <a:t>PocketBeagle</a:t>
+                      </a:r>
+                      <a:r>
+                        <a:rPr lang="en-US" b="0" dirty="0"/>
+                        <a:t>, </a:t>
+                      </a:r>
+                      <a:r>
+                        <a:rPr lang="en-US" b="0" dirty="0" err="1"/>
+                        <a:t>microUSB</a:t>
+                      </a:r>
+                      <a:r>
+                        <a:rPr lang="en-US" b="0" dirty="0"/>
+                        <a:t> Cable</a:t>
+                      </a:r>
+                    </a:p>
+                  </a:txBody>
+                  <a:tcPr/>
+                </a:tc>
+                <a:tc>
+                  <a:txBody>
+                    <a:bodyPr/>
+                    <a:lstStyle/>
+                    <a:p>
+                      <a:r>
+                        <a:rPr lang="en-US" b="0" dirty="0"/>
+                        <a:t>OEDK</a:t>
+                      </a:r>
+                    </a:p>
+                  </a:txBody>
+                  <a:tcPr/>
+                </a:tc>
+                <a:tc>
+                  <a:txBody>
+                    <a:bodyPr/>
+                    <a:lstStyle/>
+                    <a:p>
+                      <a:r>
+                        <a:rPr lang="en-US" b="0" dirty="0"/>
+                        <a:t>$0</a:t>
+                      </a:r>
+                    </a:p>
+                  </a:txBody>
+                  <a:tcPr/>
+                </a:tc>
+                <a:extLst>
+                  <a:ext uri="{0D108BD9-81ED-4DB2-BD59-A6C34878D82A}">
+                    <a16:rowId xmlns:a16="http://schemas.microsoft.com/office/drawing/2014/main" val="1252842220"/>
+                  </a:ext>
+                </a:extLst>
+              </a:tr>
+              <a:tr h="370840">
+                <a:tc>
+                  <a:txBody>
+                    <a:bodyPr/>
+                    <a:lstStyle/>
+                    <a:p>
+                      <a:r>
+                        <a:rPr lang="en-US" b="0" dirty="0"/>
+                        <a:t>Headphones</a:t>
+                      </a:r>
+                    </a:p>
+                  </a:txBody>
+                  <a:tcPr/>
+                </a:tc>
+                <a:tc>
+                  <a:txBody>
+                    <a:bodyPr/>
+                    <a:lstStyle/>
+                    <a:p>
+                      <a:r>
+                        <a:rPr lang="en-US" b="1" dirty="0"/>
+                        <a:t>No</a:t>
+                      </a:r>
+                    </a:p>
+                  </a:txBody>
+                  <a:tcPr/>
+                </a:tc>
+                <a:tc>
+                  <a:txBody>
+                    <a:bodyPr/>
+                    <a:lstStyle/>
+                    <a:p>
+                      <a:r>
+                        <a:rPr lang="en-US" b="0" dirty="0"/>
+                        <a:t>$0</a:t>
+                      </a:r>
+                    </a:p>
+                  </a:txBody>
+                  <a:tcPr/>
+                </a:tc>
+                <a:extLst>
+                  <a:ext uri="{0D108BD9-81ED-4DB2-BD59-A6C34878D82A}">
+                    <a16:rowId xmlns:a16="http://schemas.microsoft.com/office/drawing/2014/main" val="2732322321"/>
+                  </a:ext>
+                </a:extLst>
+              </a:tr>
+              <a:tr h="370840">
+                <a:tc>
+                  <a:txBody>
+                    <a:bodyPr/>
+                    <a:lstStyle/>
+                    <a:p>
+                      <a:r>
+                        <a:rPr lang="en-US" b="0" dirty="0"/>
+                        <a:t>Electrical Tape</a:t>
+                      </a:r>
+                    </a:p>
+                  </a:txBody>
+                  <a:tcPr/>
+                </a:tc>
+                <a:tc>
+                  <a:txBody>
+                    <a:bodyPr/>
+                    <a:lstStyle/>
+                    <a:p>
+                      <a:r>
+                        <a:rPr lang="en-US" dirty="0"/>
+                        <a:t>OEDK</a:t>
+                      </a:r>
+                    </a:p>
+                  </a:txBody>
+                  <a:tcPr/>
+                </a:tc>
+                <a:tc>
+                  <a:txBody>
+                    <a:bodyPr/>
+                    <a:lstStyle/>
+                    <a:p>
+                      <a:r>
+                        <a:rPr lang="en-US" dirty="0"/>
+                        <a:t>$0</a:t>
+                      </a:r>
+                    </a:p>
+                  </a:txBody>
+                  <a:tcPr/>
+                </a:tc>
+                <a:extLst>
+                  <a:ext uri="{0D108BD9-81ED-4DB2-BD59-A6C34878D82A}">
+                    <a16:rowId xmlns:a16="http://schemas.microsoft.com/office/drawing/2014/main" val="1705109448"/>
                   </a:ext>
                 </a:extLst>
               </a:tr>
@@ -16400,7 +16629,7 @@
                 </a:tc>
                 <a:extLst>
                   <a:ext uri="{0D108BD9-81ED-4DB2-BD59-A6C34878D82A}">
-                    <a16:rowId xmlns:a16="http://schemas.microsoft.com/office/drawing/2014/main" val="2337708406"/>
+                    <a16:rowId xmlns:a16="http://schemas.microsoft.com/office/drawing/2014/main" val="4182519105"/>
                   </a:ext>
                 </a:extLst>
               </a:tr>
@@ -16424,8 +16653,8 @@
         </p:nvSpPr>
         <p:spPr>
           <a:xfrm>
-            <a:off x="609600" y="4038600"/>
-            <a:ext cx="10972800" cy="914401"/>
+            <a:off x="609600" y="5603239"/>
+            <a:ext cx="10972800" cy="568962"/>
           </a:xfrm>
           <a:prstGeom prst="rect">
             <a:avLst/>
@@ -16478,7 +16707,7 @@
         </p:nvSpPr>
         <p:spPr>
           <a:xfrm>
-            <a:off x="609600" y="4953001"/>
+            <a:off x="612913" y="6172201"/>
             <a:ext cx="10972800" cy="923330"/>
           </a:xfrm>
           <a:prstGeom prst="rect">

</xml_diff>